<commit_message>
corrected my slide for the demo
</commit_message>
<xml_diff>
--- a/DEMO1/Property Investor Optimiser_Demo1.pptx
+++ b/DEMO1/Property Investor Optimiser_Demo1.pptx
@@ -111,6 +111,11 @@
       </a:defRPr>
     </a:lvl9pPr>
   </p:defaultTextStyle>
+  <p:extLst>
+    <p:ext uri="{EFAFB233-063F-42B5-8137-9DF3F51BA10A}">
+      <p15:sldGuideLst xmlns:p15="http://schemas.microsoft.com/office/powerpoint/2012/main"/>
+    </p:ext>
+  </p:extLst>
 </p:presentation>
 </file>
 
@@ -312,7 +317,7 @@
             <a:fld id="{8E36636D-D922-432D-A958-524484B5923D}" type="datetimeFigureOut">
               <a:rPr lang="en-US" dirty="0"/>
               <a:pPr/>
-              <a:t>5/26/2016</a:t>
+              <a:t>5/27/2016</a:t>
             </a:fld>
             <a:endParaRPr lang="en-US" dirty="0"/>
           </a:p>
@@ -606,7 +611,7 @@
           <a:p>
             <a:fld id="{48A87A34-81AB-432B-8DAE-1953F412C126}" type="datetimeFigureOut">
               <a:rPr lang="en-US" dirty="0"/>
-              <a:t>5/26/2016</a:t>
+              <a:t>5/27/2016</a:t>
             </a:fld>
             <a:endParaRPr lang="en-US" dirty="0"/>
           </a:p>
@@ -793,7 +798,7 @@
           <a:p>
             <a:fld id="{48A87A34-81AB-432B-8DAE-1953F412C126}" type="datetimeFigureOut">
               <a:rPr lang="en-US" dirty="0"/>
-              <a:t>5/26/2016</a:t>
+              <a:t>5/27/2016</a:t>
             </a:fld>
             <a:endParaRPr lang="en-US" dirty="0"/>
           </a:p>
@@ -1049,7 +1054,7 @@
           <a:p>
             <a:fld id="{48A87A34-81AB-432B-8DAE-1953F412C126}" type="datetimeFigureOut">
               <a:rPr lang="en-US" dirty="0"/>
-              <a:t>5/26/2016</a:t>
+              <a:t>5/27/2016</a:t>
             </a:fld>
             <a:endParaRPr lang="en-US" dirty="0"/>
           </a:p>
@@ -1468,7 +1473,7 @@
           <a:p>
             <a:fld id="{48A87A34-81AB-432B-8DAE-1953F412C126}" type="datetimeFigureOut">
               <a:rPr lang="en-US" dirty="0"/>
-              <a:t>5/26/2016</a:t>
+              <a:t>5/27/2016</a:t>
             </a:fld>
             <a:endParaRPr lang="en-US" dirty="0"/>
           </a:p>
@@ -2000,7 +2005,7 @@
           <a:p>
             <a:fld id="{48A87A34-81AB-432B-8DAE-1953F412C126}" type="datetimeFigureOut">
               <a:rPr lang="en-US" dirty="0"/>
-              <a:t>5/26/2016</a:t>
+              <a:t>5/27/2016</a:t>
             </a:fld>
             <a:endParaRPr lang="en-US" dirty="0"/>
           </a:p>
@@ -2859,7 +2864,7 @@
           <a:p>
             <a:fld id="{48A87A34-81AB-432B-8DAE-1953F412C126}" type="datetimeFigureOut">
               <a:rPr lang="en-US" dirty="0"/>
-              <a:t>5/26/2016</a:t>
+              <a:t>5/27/2016</a:t>
             </a:fld>
             <a:endParaRPr lang="en-US" dirty="0"/>
           </a:p>
@@ -3025,7 +3030,7 @@
             <a:fld id="{8E36636D-D922-432D-A958-524484B5923D}" type="datetimeFigureOut">
               <a:rPr lang="en-US" dirty="0"/>
               <a:pPr/>
-              <a:t>5/26/2016</a:t>
+              <a:t>5/27/2016</a:t>
             </a:fld>
             <a:endParaRPr lang="en-US" dirty="0"/>
           </a:p>
@@ -3206,7 +3211,7 @@
             <a:fld id="{8E36636D-D922-432D-A958-524484B5923D}" type="datetimeFigureOut">
               <a:rPr lang="en-US" dirty="0"/>
               <a:pPr/>
-              <a:t>5/26/2016</a:t>
+              <a:t>5/27/2016</a:t>
             </a:fld>
             <a:endParaRPr lang="en-US" dirty="0"/>
           </a:p>
@@ -3373,7 +3378,7 @@
             <a:fld id="{8E36636D-D922-432D-A958-524484B5923D}" type="datetimeFigureOut">
               <a:rPr lang="en-US" dirty="0"/>
               <a:pPr/>
-              <a:t>5/26/2016</a:t>
+              <a:t>5/27/2016</a:t>
             </a:fld>
             <a:endParaRPr lang="en-US" dirty="0"/>
           </a:p>
@@ -3614,7 +3619,7 @@
             <a:fld id="{8E36636D-D922-432D-A958-524484B5923D}" type="datetimeFigureOut">
               <a:rPr lang="en-US" dirty="0"/>
               <a:pPr/>
-              <a:t>5/26/2016</a:t>
+              <a:t>5/27/2016</a:t>
             </a:fld>
             <a:endParaRPr lang="en-US" dirty="0"/>
           </a:p>
@@ -3847,7 +3852,7 @@
             <a:fld id="{8E36636D-D922-432D-A958-524484B5923D}" type="datetimeFigureOut">
               <a:rPr lang="en-US" dirty="0"/>
               <a:pPr/>
-              <a:t>5/26/2016</a:t>
+              <a:t>5/27/2016</a:t>
             </a:fld>
             <a:endParaRPr lang="en-US" dirty="0"/>
           </a:p>
@@ -4310,7 +4315,7 @@
             <a:fld id="{8E36636D-D922-432D-A958-524484B5923D}" type="datetimeFigureOut">
               <a:rPr lang="en-US" dirty="0"/>
               <a:pPr/>
-              <a:t>5/26/2016</a:t>
+              <a:t>5/27/2016</a:t>
             </a:fld>
             <a:endParaRPr lang="en-US" dirty="0"/>
           </a:p>
@@ -4425,7 +4430,7 @@
             <a:fld id="{8E36636D-D922-432D-A958-524484B5923D}" type="datetimeFigureOut">
               <a:rPr lang="en-US" dirty="0"/>
               <a:pPr/>
-              <a:t>5/26/2016</a:t>
+              <a:t>5/27/2016</a:t>
             </a:fld>
             <a:endParaRPr lang="en-US" dirty="0"/>
           </a:p>
@@ -4517,7 +4522,7 @@
             <a:fld id="{8E36636D-D922-432D-A958-524484B5923D}" type="datetimeFigureOut">
               <a:rPr lang="en-US" dirty="0"/>
               <a:pPr/>
-              <a:t>5/26/2016</a:t>
+              <a:t>5/27/2016</a:t>
             </a:fld>
             <a:endParaRPr lang="en-US" dirty="0"/>
           </a:p>
@@ -4769,7 +4774,7 @@
             <a:fld id="{8E36636D-D922-432D-A958-524484B5923D}" type="datetimeFigureOut">
               <a:rPr lang="en-US" dirty="0"/>
               <a:pPr/>
-              <a:t>5/26/2016</a:t>
+              <a:t>5/27/2016</a:t>
             </a:fld>
             <a:endParaRPr lang="en-US" dirty="0"/>
           </a:p>
@@ -5066,7 +5071,7 @@
             <a:fld id="{8E36636D-D922-432D-A958-524484B5923D}" type="datetimeFigureOut">
               <a:rPr lang="en-US" dirty="0"/>
               <a:pPr/>
-              <a:t>5/26/2016</a:t>
+              <a:t>5/27/2016</a:t>
             </a:fld>
             <a:endParaRPr lang="en-US" dirty="0"/>
           </a:p>
@@ -5297,7 +5302,7 @@
             <a:fld id="{8E36636D-D922-432D-A958-524484B5923D}" type="datetimeFigureOut">
               <a:rPr lang="en-US" dirty="0"/>
               <a:pPr/>
-              <a:t>5/26/2016</a:t>
+              <a:t>5/27/2016</a:t>
             </a:fld>
             <a:endParaRPr lang="en-US" dirty="0"/>
           </a:p>
@@ -6654,7 +6659,19 @@
             </a:r>
             <a:r>
               <a:rPr lang="en-US" sz="3200" dirty="0" smtClean="0"/>
-              <a:t>of a portfolio of properties of rentals.</a:t>
+              <a:t>of a portfolio </a:t>
+            </a:r>
+            <a:r>
+              <a:rPr lang="en-US" sz="3200" dirty="0" smtClean="0"/>
+              <a:t>of</a:t>
+            </a:r>
+            <a:r>
+              <a:rPr lang="en-US" sz="3200" dirty="0" smtClean="0"/>
+              <a:t> rentals properties</a:t>
+            </a:r>
+            <a:r>
+              <a:rPr lang="en-US" sz="3200" dirty="0"/>
+              <a:t>.</a:t>
             </a:r>
             <a:endParaRPr lang="en-US" sz="3200" dirty="0"/>
           </a:p>

</xml_diff>